<commit_message>
ruled sheet added in template
</commit_message>
<xml_diff>
--- a/intel_ocr/docs/template.pptx
+++ b/intel_ocr/docs/template.pptx
@@ -6,6 +6,7 @@
   </p:sldMasterIdLst>
   <p:sldIdLst>
     <p:sldId id="257" r:id="rId2"/>
+    <p:sldId id="258" r:id="rId3"/>
   </p:sldIdLst>
   <p:sldSz cx="6858000" cy="9906000" type="A4"/>
   <p:notesSz cx="6858000" cy="9926638"/>
@@ -254,7 +255,7 @@
           <a:p>
             <a:fld id="{CFF50B5B-BB5D-42B0-8A6E-E4B0422C937A}" type="datetimeFigureOut">
               <a:rPr lang="en-US" smtClean="0"/>
-              <a:t>05-Sep-19</a:t>
+              <a:t>09-Sep-19</a:t>
             </a:fld>
             <a:endParaRPr lang="en-US"/>
           </a:p>
@@ -424,7 +425,7 @@
           <a:p>
             <a:fld id="{CFF50B5B-BB5D-42B0-8A6E-E4B0422C937A}" type="datetimeFigureOut">
               <a:rPr lang="en-US" smtClean="0"/>
-              <a:t>05-Sep-19</a:t>
+              <a:t>09-Sep-19</a:t>
             </a:fld>
             <a:endParaRPr lang="en-US"/>
           </a:p>
@@ -604,7 +605,7 @@
           <a:p>
             <a:fld id="{CFF50B5B-BB5D-42B0-8A6E-E4B0422C937A}" type="datetimeFigureOut">
               <a:rPr lang="en-US" smtClean="0"/>
-              <a:t>05-Sep-19</a:t>
+              <a:t>09-Sep-19</a:t>
             </a:fld>
             <a:endParaRPr lang="en-US"/>
           </a:p>
@@ -774,7 +775,7 @@
           <a:p>
             <a:fld id="{CFF50B5B-BB5D-42B0-8A6E-E4B0422C937A}" type="datetimeFigureOut">
               <a:rPr lang="en-US" smtClean="0"/>
-              <a:t>05-Sep-19</a:t>
+              <a:t>09-Sep-19</a:t>
             </a:fld>
             <a:endParaRPr lang="en-US"/>
           </a:p>
@@ -1020,7 +1021,7 @@
           <a:p>
             <a:fld id="{CFF50B5B-BB5D-42B0-8A6E-E4B0422C937A}" type="datetimeFigureOut">
               <a:rPr lang="en-US" smtClean="0"/>
-              <a:t>05-Sep-19</a:t>
+              <a:t>09-Sep-19</a:t>
             </a:fld>
             <a:endParaRPr lang="en-US"/>
           </a:p>
@@ -1252,7 +1253,7 @@
           <a:p>
             <a:fld id="{CFF50B5B-BB5D-42B0-8A6E-E4B0422C937A}" type="datetimeFigureOut">
               <a:rPr lang="en-US" smtClean="0"/>
-              <a:t>05-Sep-19</a:t>
+              <a:t>09-Sep-19</a:t>
             </a:fld>
             <a:endParaRPr lang="en-US"/>
           </a:p>
@@ -1619,7 +1620,7 @@
           <a:p>
             <a:fld id="{CFF50B5B-BB5D-42B0-8A6E-E4B0422C937A}" type="datetimeFigureOut">
               <a:rPr lang="en-US" smtClean="0"/>
-              <a:t>05-Sep-19</a:t>
+              <a:t>09-Sep-19</a:t>
             </a:fld>
             <a:endParaRPr lang="en-US"/>
           </a:p>
@@ -1737,7 +1738,7 @@
           <a:p>
             <a:fld id="{CFF50B5B-BB5D-42B0-8A6E-E4B0422C937A}" type="datetimeFigureOut">
               <a:rPr lang="en-US" smtClean="0"/>
-              <a:t>05-Sep-19</a:t>
+              <a:t>09-Sep-19</a:t>
             </a:fld>
             <a:endParaRPr lang="en-US"/>
           </a:p>
@@ -1832,7 +1833,7 @@
           <a:p>
             <a:fld id="{CFF50B5B-BB5D-42B0-8A6E-E4B0422C937A}" type="datetimeFigureOut">
               <a:rPr lang="en-US" smtClean="0"/>
-              <a:t>05-Sep-19</a:t>
+              <a:t>09-Sep-19</a:t>
             </a:fld>
             <a:endParaRPr lang="en-US"/>
           </a:p>
@@ -2109,7 +2110,7 @@
           <a:p>
             <a:fld id="{CFF50B5B-BB5D-42B0-8A6E-E4B0422C937A}" type="datetimeFigureOut">
               <a:rPr lang="en-US" smtClean="0"/>
-              <a:t>05-Sep-19</a:t>
+              <a:t>09-Sep-19</a:t>
             </a:fld>
             <a:endParaRPr lang="en-US"/>
           </a:p>
@@ -2362,7 +2363,7 @@
           <a:p>
             <a:fld id="{CFF50B5B-BB5D-42B0-8A6E-E4B0422C937A}" type="datetimeFigureOut">
               <a:rPr lang="en-US" smtClean="0"/>
-              <a:t>05-Sep-19</a:t>
+              <a:t>09-Sep-19</a:t>
             </a:fld>
             <a:endParaRPr lang="en-US"/>
           </a:p>
@@ -2575,7 +2576,7 @@
           <a:p>
             <a:fld id="{CFF50B5B-BB5D-42B0-8A6E-E4B0422C937A}" type="datetimeFigureOut">
               <a:rPr lang="en-US" smtClean="0"/>
-              <a:t>05-Sep-19</a:t>
+              <a:t>09-Sep-19</a:t>
             </a:fld>
             <a:endParaRPr lang="en-US"/>
           </a:p>
@@ -3640,7 +3641,7 @@
         </p:nvSpPr>
         <p:spPr>
           <a:xfrm>
-            <a:off x="377311" y="594611"/>
+            <a:off x="379818" y="594611"/>
             <a:ext cx="6099350" cy="180433"/>
           </a:xfrm>
           <a:prstGeom prst="rect">
@@ -4365,6 +4366,1519 @@
     <p:extLst>
       <p:ext uri="{BB962C8B-B14F-4D97-AF65-F5344CB8AC3E}">
         <p14:creationId xmlns:p14="http://schemas.microsoft.com/office/powerpoint/2010/main" val="3297357377"/>
+      </p:ext>
+    </p:extLst>
+  </p:cSld>
+  <p:clrMapOvr>
+    <a:masterClrMapping/>
+  </p:clrMapOvr>
+</p:sld>
+</file>
+
+<file path=ppt/slides/slide2.xml><?xml version="1.0" encoding="utf-8"?>
+<p:sld xmlns:a="http://schemas.openxmlformats.org/drawingml/2006/main" xmlns:r="http://schemas.openxmlformats.org/officeDocument/2006/relationships" xmlns:p="http://schemas.openxmlformats.org/presentationml/2006/main">
+  <p:cSld>
+    <p:spTree>
+      <p:nvGrpSpPr>
+        <p:cNvPr id="1" name=""/>
+        <p:cNvGrpSpPr/>
+        <p:nvPr/>
+      </p:nvGrpSpPr>
+      <p:grpSpPr>
+        <a:xfrm>
+          <a:off x="0" y="0"/>
+          <a:ext cx="0" cy="0"/>
+          <a:chOff x="0" y="0"/>
+          <a:chExt cx="0" cy="0"/>
+        </a:xfrm>
+      </p:grpSpPr>
+      <p:sp>
+        <p:nvSpPr>
+          <p:cNvPr id="18" name="Rectangle 17"/>
+          <p:cNvSpPr/>
+          <p:nvPr/>
+        </p:nvSpPr>
+        <p:spPr>
+          <a:xfrm>
+            <a:off x="2514600" y="3532952"/>
+            <a:ext cx="914400" cy="180433"/>
+          </a:xfrm>
+          <a:prstGeom prst="rect">
+            <a:avLst/>
+          </a:prstGeom>
+          <a:noFill/>
+        </p:spPr>
+        <p:style>
+          <a:lnRef idx="2">
+            <a:schemeClr val="accent1">
+              <a:shade val="50000"/>
+            </a:schemeClr>
+          </a:lnRef>
+          <a:fillRef idx="1">
+            <a:schemeClr val="accent1"/>
+          </a:fillRef>
+          <a:effectRef idx="0">
+            <a:schemeClr val="accent1"/>
+          </a:effectRef>
+          <a:fontRef idx="minor">
+            <a:schemeClr val="lt1"/>
+          </a:fontRef>
+        </p:style>
+        <p:txBody>
+          <a:bodyPr rtlCol="0" anchor="ctr"/>
+          <a:lstStyle/>
+          <a:p>
+            <a:pPr algn="ctr"/>
+            <a:endParaRPr lang="en-US"/>
+          </a:p>
+        </p:txBody>
+      </p:sp>
+      <p:sp>
+        <p:nvSpPr>
+          <p:cNvPr id="6" name="Rectangle 5"/>
+          <p:cNvSpPr/>
+          <p:nvPr/>
+        </p:nvSpPr>
+        <p:spPr>
+          <a:xfrm>
+            <a:off x="78006" y="150725"/>
+            <a:ext cx="464605" cy="140678"/>
+          </a:xfrm>
+          <a:prstGeom prst="rect">
+            <a:avLst/>
+          </a:prstGeom>
+        </p:spPr>
+        <p:style>
+          <a:lnRef idx="2">
+            <a:schemeClr val="accent1">
+              <a:shade val="50000"/>
+            </a:schemeClr>
+          </a:lnRef>
+          <a:fillRef idx="1">
+            <a:schemeClr val="accent1"/>
+          </a:fillRef>
+          <a:effectRef idx="0">
+            <a:schemeClr val="accent1"/>
+          </a:effectRef>
+          <a:fontRef idx="minor">
+            <a:schemeClr val="lt1"/>
+          </a:fontRef>
+        </p:style>
+        <p:txBody>
+          <a:bodyPr rtlCol="0" anchor="ctr"/>
+          <a:lstStyle/>
+          <a:p>
+            <a:pPr algn="ctr"/>
+            <a:endParaRPr lang="en-US"/>
+          </a:p>
+        </p:txBody>
+      </p:sp>
+      <p:sp>
+        <p:nvSpPr>
+          <p:cNvPr id="7" name="Rectangle 6"/>
+          <p:cNvSpPr/>
+          <p:nvPr/>
+        </p:nvSpPr>
+        <p:spPr>
+          <a:xfrm>
+            <a:off x="6320413" y="150725"/>
+            <a:ext cx="461748" cy="140678"/>
+          </a:xfrm>
+          <a:prstGeom prst="rect">
+            <a:avLst/>
+          </a:prstGeom>
+        </p:spPr>
+        <p:style>
+          <a:lnRef idx="2">
+            <a:schemeClr val="accent1">
+              <a:shade val="50000"/>
+            </a:schemeClr>
+          </a:lnRef>
+          <a:fillRef idx="1">
+            <a:schemeClr val="accent1"/>
+          </a:fillRef>
+          <a:effectRef idx="0">
+            <a:schemeClr val="accent1"/>
+          </a:effectRef>
+          <a:fontRef idx="minor">
+            <a:schemeClr val="lt1"/>
+          </a:fontRef>
+        </p:style>
+        <p:txBody>
+          <a:bodyPr rtlCol="0" anchor="ctr"/>
+          <a:lstStyle/>
+          <a:p>
+            <a:pPr algn="ctr"/>
+            <a:endParaRPr lang="en-US"/>
+          </a:p>
+        </p:txBody>
+      </p:sp>
+      <p:sp>
+        <p:nvSpPr>
+          <p:cNvPr id="8" name="Rectangle 7"/>
+          <p:cNvSpPr/>
+          <p:nvPr/>
+        </p:nvSpPr>
+        <p:spPr>
+          <a:xfrm>
+            <a:off x="159488" y="9616273"/>
+            <a:ext cx="383123" cy="134645"/>
+          </a:xfrm>
+          <a:prstGeom prst="rect">
+            <a:avLst/>
+          </a:prstGeom>
+        </p:spPr>
+        <p:style>
+          <a:lnRef idx="2">
+            <a:schemeClr val="accent1">
+              <a:shade val="50000"/>
+            </a:schemeClr>
+          </a:lnRef>
+          <a:fillRef idx="1">
+            <a:schemeClr val="accent1"/>
+          </a:fillRef>
+          <a:effectRef idx="0">
+            <a:schemeClr val="accent1"/>
+          </a:effectRef>
+          <a:fontRef idx="minor">
+            <a:schemeClr val="lt1"/>
+          </a:fontRef>
+        </p:style>
+        <p:txBody>
+          <a:bodyPr rtlCol="0" anchor="ctr"/>
+          <a:lstStyle/>
+          <a:p>
+            <a:pPr algn="ctr"/>
+            <a:endParaRPr lang="en-US"/>
+          </a:p>
+        </p:txBody>
+      </p:sp>
+      <p:sp>
+        <p:nvSpPr>
+          <p:cNvPr id="9" name="Rectangle 8"/>
+          <p:cNvSpPr/>
+          <p:nvPr/>
+        </p:nvSpPr>
+        <p:spPr>
+          <a:xfrm>
+            <a:off x="6320413" y="9616273"/>
+            <a:ext cx="390488" cy="134645"/>
+          </a:xfrm>
+          <a:prstGeom prst="rect">
+            <a:avLst/>
+          </a:prstGeom>
+        </p:spPr>
+        <p:style>
+          <a:lnRef idx="2">
+            <a:schemeClr val="accent1">
+              <a:shade val="50000"/>
+            </a:schemeClr>
+          </a:lnRef>
+          <a:fillRef idx="1">
+            <a:schemeClr val="accent1"/>
+          </a:fillRef>
+          <a:effectRef idx="0">
+            <a:schemeClr val="accent1"/>
+          </a:effectRef>
+          <a:fontRef idx="minor">
+            <a:schemeClr val="lt1"/>
+          </a:fontRef>
+        </p:style>
+        <p:txBody>
+          <a:bodyPr rtlCol="0" anchor="ctr"/>
+          <a:lstStyle/>
+          <a:p>
+            <a:pPr algn="ctr"/>
+            <a:endParaRPr lang="en-US"/>
+          </a:p>
+        </p:txBody>
+      </p:sp>
+      <p:sp>
+        <p:nvSpPr>
+          <p:cNvPr id="14" name="Rectangle 13"/>
+          <p:cNvSpPr/>
+          <p:nvPr/>
+        </p:nvSpPr>
+        <p:spPr>
+          <a:xfrm>
+            <a:off x="371788" y="3532952"/>
+            <a:ext cx="6099350" cy="180433"/>
+          </a:xfrm>
+          <a:prstGeom prst="rect">
+            <a:avLst/>
+          </a:prstGeom>
+          <a:noFill/>
+        </p:spPr>
+        <p:style>
+          <a:lnRef idx="2">
+            <a:schemeClr val="accent1">
+              <a:shade val="50000"/>
+            </a:schemeClr>
+          </a:lnRef>
+          <a:fillRef idx="1">
+            <a:schemeClr val="accent1"/>
+          </a:fillRef>
+          <a:effectRef idx="0">
+            <a:schemeClr val="accent1"/>
+          </a:effectRef>
+          <a:fontRef idx="minor">
+            <a:schemeClr val="lt1"/>
+          </a:fontRef>
+        </p:style>
+        <p:txBody>
+          <a:bodyPr rtlCol="0" anchor="ctr"/>
+          <a:lstStyle/>
+          <a:p>
+            <a:pPr algn="ctr"/>
+            <a:endParaRPr lang="en-US"/>
+          </a:p>
+        </p:txBody>
+      </p:sp>
+      <p:sp>
+        <p:nvSpPr>
+          <p:cNvPr id="16" name="Rectangle 15"/>
+          <p:cNvSpPr/>
+          <p:nvPr/>
+        </p:nvSpPr>
+        <p:spPr>
+          <a:xfrm>
+            <a:off x="371374" y="6594592"/>
+            <a:ext cx="6099350" cy="180433"/>
+          </a:xfrm>
+          <a:prstGeom prst="rect">
+            <a:avLst/>
+          </a:prstGeom>
+          <a:noFill/>
+        </p:spPr>
+        <p:style>
+          <a:lnRef idx="2">
+            <a:schemeClr val="accent1">
+              <a:shade val="50000"/>
+            </a:schemeClr>
+          </a:lnRef>
+          <a:fillRef idx="1">
+            <a:schemeClr val="accent1"/>
+          </a:fillRef>
+          <a:effectRef idx="0">
+            <a:schemeClr val="accent1"/>
+          </a:effectRef>
+          <a:fontRef idx="minor">
+            <a:schemeClr val="lt1"/>
+          </a:fontRef>
+        </p:style>
+        <p:txBody>
+          <a:bodyPr rtlCol="0" anchor="ctr"/>
+          <a:lstStyle/>
+          <a:p>
+            <a:pPr algn="ctr"/>
+            <a:endParaRPr lang="en-US"/>
+          </a:p>
+        </p:txBody>
+      </p:sp>
+      <p:sp>
+        <p:nvSpPr>
+          <p:cNvPr id="2" name="Rectangle 1"/>
+          <p:cNvSpPr/>
+          <p:nvPr/>
+        </p:nvSpPr>
+        <p:spPr>
+          <a:xfrm>
+            <a:off x="691376" y="3532952"/>
+            <a:ext cx="914400" cy="180433"/>
+          </a:xfrm>
+          <a:prstGeom prst="rect">
+            <a:avLst/>
+          </a:prstGeom>
+          <a:noFill/>
+        </p:spPr>
+        <p:style>
+          <a:lnRef idx="2">
+            <a:schemeClr val="accent1">
+              <a:shade val="50000"/>
+            </a:schemeClr>
+          </a:lnRef>
+          <a:fillRef idx="1">
+            <a:schemeClr val="accent1"/>
+          </a:fillRef>
+          <a:effectRef idx="0">
+            <a:schemeClr val="accent1"/>
+          </a:effectRef>
+          <a:fontRef idx="minor">
+            <a:schemeClr val="lt1"/>
+          </a:fontRef>
+        </p:style>
+        <p:txBody>
+          <a:bodyPr rtlCol="0" anchor="ctr"/>
+          <a:lstStyle/>
+          <a:p>
+            <a:pPr algn="ctr"/>
+            <a:endParaRPr lang="en-US"/>
+          </a:p>
+        </p:txBody>
+      </p:sp>
+      <p:sp>
+        <p:nvSpPr>
+          <p:cNvPr id="17" name="Rectangle 16"/>
+          <p:cNvSpPr/>
+          <p:nvPr/>
+        </p:nvSpPr>
+        <p:spPr>
+          <a:xfrm>
+            <a:off x="4337824" y="3532952"/>
+            <a:ext cx="914400" cy="180433"/>
+          </a:xfrm>
+          <a:prstGeom prst="rect">
+            <a:avLst/>
+          </a:prstGeom>
+          <a:noFill/>
+        </p:spPr>
+        <p:style>
+          <a:lnRef idx="2">
+            <a:schemeClr val="accent1">
+              <a:shade val="50000"/>
+            </a:schemeClr>
+          </a:lnRef>
+          <a:fillRef idx="1">
+            <a:schemeClr val="accent1"/>
+          </a:fillRef>
+          <a:effectRef idx="0">
+            <a:schemeClr val="accent1"/>
+          </a:effectRef>
+          <a:fontRef idx="minor">
+            <a:schemeClr val="lt1"/>
+          </a:fontRef>
+        </p:style>
+        <p:txBody>
+          <a:bodyPr rtlCol="0" anchor="ctr"/>
+          <a:lstStyle/>
+          <a:p>
+            <a:pPr algn="ctr"/>
+            <a:endParaRPr lang="en-US"/>
+          </a:p>
+        </p:txBody>
+      </p:sp>
+      <p:sp>
+        <p:nvSpPr>
+          <p:cNvPr id="19" name="Rectangle 18"/>
+          <p:cNvSpPr/>
+          <p:nvPr/>
+        </p:nvSpPr>
+        <p:spPr>
+          <a:xfrm>
+            <a:off x="6166195" y="3532953"/>
+            <a:ext cx="304943" cy="174350"/>
+          </a:xfrm>
+          <a:prstGeom prst="rect">
+            <a:avLst/>
+          </a:prstGeom>
+          <a:noFill/>
+        </p:spPr>
+        <p:style>
+          <a:lnRef idx="2">
+            <a:schemeClr val="accent1">
+              <a:shade val="50000"/>
+            </a:schemeClr>
+          </a:lnRef>
+          <a:fillRef idx="1">
+            <a:schemeClr val="accent1"/>
+          </a:fillRef>
+          <a:effectRef idx="0">
+            <a:schemeClr val="accent1"/>
+          </a:effectRef>
+          <a:fontRef idx="minor">
+            <a:schemeClr val="lt1"/>
+          </a:fontRef>
+        </p:style>
+        <p:txBody>
+          <a:bodyPr rtlCol="0" anchor="ctr"/>
+          <a:lstStyle/>
+          <a:p>
+            <a:pPr algn="ctr"/>
+            <a:endParaRPr lang="en-US"/>
+          </a:p>
+        </p:txBody>
+      </p:sp>
+      <p:sp>
+        <p:nvSpPr>
+          <p:cNvPr id="20" name="Rectangle 19"/>
+          <p:cNvSpPr/>
+          <p:nvPr/>
+        </p:nvSpPr>
+        <p:spPr>
+          <a:xfrm>
+            <a:off x="691376" y="6594592"/>
+            <a:ext cx="914400" cy="180433"/>
+          </a:xfrm>
+          <a:prstGeom prst="rect">
+            <a:avLst/>
+          </a:prstGeom>
+          <a:noFill/>
+        </p:spPr>
+        <p:style>
+          <a:lnRef idx="2">
+            <a:schemeClr val="accent1">
+              <a:shade val="50000"/>
+            </a:schemeClr>
+          </a:lnRef>
+          <a:fillRef idx="1">
+            <a:schemeClr val="accent1"/>
+          </a:fillRef>
+          <a:effectRef idx="0">
+            <a:schemeClr val="accent1"/>
+          </a:effectRef>
+          <a:fontRef idx="minor">
+            <a:schemeClr val="lt1"/>
+          </a:fontRef>
+        </p:style>
+        <p:txBody>
+          <a:bodyPr rtlCol="0" anchor="ctr"/>
+          <a:lstStyle/>
+          <a:p>
+            <a:pPr algn="ctr"/>
+            <a:endParaRPr lang="en-US"/>
+          </a:p>
+        </p:txBody>
+      </p:sp>
+      <p:sp>
+        <p:nvSpPr>
+          <p:cNvPr id="24" name="Rectangle 23"/>
+          <p:cNvSpPr/>
+          <p:nvPr/>
+        </p:nvSpPr>
+        <p:spPr>
+          <a:xfrm>
+            <a:off x="2514600" y="6594592"/>
+            <a:ext cx="914400" cy="180433"/>
+          </a:xfrm>
+          <a:prstGeom prst="rect">
+            <a:avLst/>
+          </a:prstGeom>
+          <a:noFill/>
+        </p:spPr>
+        <p:style>
+          <a:lnRef idx="2">
+            <a:schemeClr val="accent1">
+              <a:shade val="50000"/>
+            </a:schemeClr>
+          </a:lnRef>
+          <a:fillRef idx="1">
+            <a:schemeClr val="accent1"/>
+          </a:fillRef>
+          <a:effectRef idx="0">
+            <a:schemeClr val="accent1"/>
+          </a:effectRef>
+          <a:fontRef idx="minor">
+            <a:schemeClr val="lt1"/>
+          </a:fontRef>
+        </p:style>
+        <p:txBody>
+          <a:bodyPr rtlCol="0" anchor="ctr"/>
+          <a:lstStyle/>
+          <a:p>
+            <a:pPr algn="ctr"/>
+            <a:endParaRPr lang="en-US"/>
+          </a:p>
+        </p:txBody>
+      </p:sp>
+      <p:sp>
+        <p:nvSpPr>
+          <p:cNvPr id="25" name="Rectangle 24"/>
+          <p:cNvSpPr/>
+          <p:nvPr/>
+        </p:nvSpPr>
+        <p:spPr>
+          <a:xfrm>
+            <a:off x="4346163" y="6594592"/>
+            <a:ext cx="914400" cy="180433"/>
+          </a:xfrm>
+          <a:prstGeom prst="rect">
+            <a:avLst/>
+          </a:prstGeom>
+          <a:noFill/>
+        </p:spPr>
+        <p:style>
+          <a:lnRef idx="2">
+            <a:schemeClr val="accent1">
+              <a:shade val="50000"/>
+            </a:schemeClr>
+          </a:lnRef>
+          <a:fillRef idx="1">
+            <a:schemeClr val="accent1"/>
+          </a:fillRef>
+          <a:effectRef idx="0">
+            <a:schemeClr val="accent1"/>
+          </a:effectRef>
+          <a:fontRef idx="minor">
+            <a:schemeClr val="lt1"/>
+          </a:fontRef>
+        </p:style>
+        <p:txBody>
+          <a:bodyPr rtlCol="0" anchor="ctr"/>
+          <a:lstStyle/>
+          <a:p>
+            <a:pPr algn="ctr"/>
+            <a:endParaRPr lang="en-US"/>
+          </a:p>
+        </p:txBody>
+      </p:sp>
+      <p:sp>
+        <p:nvSpPr>
+          <p:cNvPr id="26" name="Rectangle 25"/>
+          <p:cNvSpPr/>
+          <p:nvPr/>
+        </p:nvSpPr>
+        <p:spPr>
+          <a:xfrm>
+            <a:off x="6166194" y="6597633"/>
+            <a:ext cx="304943" cy="174350"/>
+          </a:xfrm>
+          <a:prstGeom prst="rect">
+            <a:avLst/>
+          </a:prstGeom>
+          <a:noFill/>
+        </p:spPr>
+        <p:style>
+          <a:lnRef idx="2">
+            <a:schemeClr val="accent1">
+              <a:shade val="50000"/>
+            </a:schemeClr>
+          </a:lnRef>
+          <a:fillRef idx="1">
+            <a:schemeClr val="accent1"/>
+          </a:fillRef>
+          <a:effectRef idx="0">
+            <a:schemeClr val="accent1"/>
+          </a:effectRef>
+          <a:fontRef idx="minor">
+            <a:schemeClr val="lt1"/>
+          </a:fontRef>
+        </p:style>
+        <p:txBody>
+          <a:bodyPr rtlCol="0" anchor="ctr"/>
+          <a:lstStyle/>
+          <a:p>
+            <a:pPr algn="ctr"/>
+            <a:endParaRPr lang="en-US"/>
+          </a:p>
+        </p:txBody>
+      </p:sp>
+      <p:sp>
+        <p:nvSpPr>
+          <p:cNvPr id="3" name="Rectangle 2"/>
+          <p:cNvSpPr/>
+          <p:nvPr/>
+        </p:nvSpPr>
+        <p:spPr>
+          <a:xfrm>
+            <a:off x="370961" y="6771983"/>
+            <a:ext cx="6099763" cy="2753017"/>
+          </a:xfrm>
+          <a:prstGeom prst="rect">
+            <a:avLst/>
+          </a:prstGeom>
+          <a:noFill/>
+        </p:spPr>
+        <p:style>
+          <a:lnRef idx="2">
+            <a:schemeClr val="accent1">
+              <a:shade val="50000"/>
+            </a:schemeClr>
+          </a:lnRef>
+          <a:fillRef idx="1">
+            <a:schemeClr val="accent1"/>
+          </a:fillRef>
+          <a:effectRef idx="0">
+            <a:schemeClr val="accent1"/>
+          </a:effectRef>
+          <a:fontRef idx="minor">
+            <a:schemeClr val="lt1"/>
+          </a:fontRef>
+        </p:style>
+        <p:txBody>
+          <a:bodyPr rtlCol="0" anchor="ctr"/>
+          <a:lstStyle/>
+          <a:p>
+            <a:pPr algn="ctr"/>
+            <a:endParaRPr lang="en-US"/>
+          </a:p>
+        </p:txBody>
+      </p:sp>
+      <p:sp>
+        <p:nvSpPr>
+          <p:cNvPr id="21" name="Rectangle 20"/>
+          <p:cNvSpPr/>
+          <p:nvPr/>
+        </p:nvSpPr>
+        <p:spPr>
+          <a:xfrm>
+            <a:off x="2513773" y="594611"/>
+            <a:ext cx="914400" cy="180433"/>
+          </a:xfrm>
+          <a:prstGeom prst="rect">
+            <a:avLst/>
+          </a:prstGeom>
+          <a:noFill/>
+        </p:spPr>
+        <p:style>
+          <a:lnRef idx="2">
+            <a:schemeClr val="accent1">
+              <a:shade val="50000"/>
+            </a:schemeClr>
+          </a:lnRef>
+          <a:fillRef idx="1">
+            <a:schemeClr val="accent1"/>
+          </a:fillRef>
+          <a:effectRef idx="0">
+            <a:schemeClr val="accent1"/>
+          </a:effectRef>
+          <a:fontRef idx="minor">
+            <a:schemeClr val="lt1"/>
+          </a:fontRef>
+        </p:style>
+        <p:txBody>
+          <a:bodyPr rtlCol="0" anchor="ctr"/>
+          <a:lstStyle/>
+          <a:p>
+            <a:pPr algn="ctr"/>
+            <a:endParaRPr lang="en-US"/>
+          </a:p>
+        </p:txBody>
+      </p:sp>
+      <p:sp>
+        <p:nvSpPr>
+          <p:cNvPr id="22" name="Rectangle 21"/>
+          <p:cNvSpPr/>
+          <p:nvPr/>
+        </p:nvSpPr>
+        <p:spPr>
+          <a:xfrm>
+            <a:off x="367786" y="594611"/>
+            <a:ext cx="6099350" cy="180433"/>
+          </a:xfrm>
+          <a:prstGeom prst="rect">
+            <a:avLst/>
+          </a:prstGeom>
+          <a:noFill/>
+        </p:spPr>
+        <p:style>
+          <a:lnRef idx="2">
+            <a:schemeClr val="accent1">
+              <a:shade val="50000"/>
+            </a:schemeClr>
+          </a:lnRef>
+          <a:fillRef idx="1">
+            <a:schemeClr val="accent1"/>
+          </a:fillRef>
+          <a:effectRef idx="0">
+            <a:schemeClr val="accent1"/>
+          </a:effectRef>
+          <a:fontRef idx="minor">
+            <a:schemeClr val="lt1"/>
+          </a:fontRef>
+        </p:style>
+        <p:txBody>
+          <a:bodyPr rtlCol="0" anchor="ctr"/>
+          <a:lstStyle/>
+          <a:p>
+            <a:pPr algn="ctr"/>
+            <a:endParaRPr lang="en-US"/>
+          </a:p>
+        </p:txBody>
+      </p:sp>
+      <p:sp>
+        <p:nvSpPr>
+          <p:cNvPr id="23" name="Rectangle 22"/>
+          <p:cNvSpPr/>
+          <p:nvPr/>
+        </p:nvSpPr>
+        <p:spPr>
+          <a:xfrm>
+            <a:off x="690549" y="594611"/>
+            <a:ext cx="914400" cy="180433"/>
+          </a:xfrm>
+          <a:prstGeom prst="rect">
+            <a:avLst/>
+          </a:prstGeom>
+          <a:noFill/>
+        </p:spPr>
+        <p:style>
+          <a:lnRef idx="2">
+            <a:schemeClr val="accent1">
+              <a:shade val="50000"/>
+            </a:schemeClr>
+          </a:lnRef>
+          <a:fillRef idx="1">
+            <a:schemeClr val="accent1"/>
+          </a:fillRef>
+          <a:effectRef idx="0">
+            <a:schemeClr val="accent1"/>
+          </a:effectRef>
+          <a:fontRef idx="minor">
+            <a:schemeClr val="lt1"/>
+          </a:fontRef>
+        </p:style>
+        <p:txBody>
+          <a:bodyPr rtlCol="0" anchor="ctr"/>
+          <a:lstStyle/>
+          <a:p>
+            <a:pPr algn="ctr"/>
+            <a:endParaRPr lang="en-US"/>
+          </a:p>
+        </p:txBody>
+      </p:sp>
+      <p:sp>
+        <p:nvSpPr>
+          <p:cNvPr id="27" name="Rectangle 26"/>
+          <p:cNvSpPr/>
+          <p:nvPr/>
+        </p:nvSpPr>
+        <p:spPr>
+          <a:xfrm>
+            <a:off x="4336997" y="594611"/>
+            <a:ext cx="914400" cy="180433"/>
+          </a:xfrm>
+          <a:prstGeom prst="rect">
+            <a:avLst/>
+          </a:prstGeom>
+          <a:noFill/>
+        </p:spPr>
+        <p:style>
+          <a:lnRef idx="2">
+            <a:schemeClr val="accent1">
+              <a:shade val="50000"/>
+            </a:schemeClr>
+          </a:lnRef>
+          <a:fillRef idx="1">
+            <a:schemeClr val="accent1"/>
+          </a:fillRef>
+          <a:effectRef idx="0">
+            <a:schemeClr val="accent1"/>
+          </a:effectRef>
+          <a:fontRef idx="minor">
+            <a:schemeClr val="lt1"/>
+          </a:fontRef>
+        </p:style>
+        <p:txBody>
+          <a:bodyPr rtlCol="0" anchor="ctr"/>
+          <a:lstStyle/>
+          <a:p>
+            <a:pPr algn="ctr"/>
+            <a:endParaRPr lang="en-US"/>
+          </a:p>
+        </p:txBody>
+      </p:sp>
+      <p:sp>
+        <p:nvSpPr>
+          <p:cNvPr id="28" name="Rectangle 27"/>
+          <p:cNvSpPr/>
+          <p:nvPr/>
+        </p:nvSpPr>
+        <p:spPr>
+          <a:xfrm>
+            <a:off x="6165368" y="594612"/>
+            <a:ext cx="305356" cy="173030"/>
+          </a:xfrm>
+          <a:prstGeom prst="rect">
+            <a:avLst/>
+          </a:prstGeom>
+          <a:noFill/>
+        </p:spPr>
+        <p:style>
+          <a:lnRef idx="2">
+            <a:schemeClr val="accent1">
+              <a:shade val="50000"/>
+            </a:schemeClr>
+          </a:lnRef>
+          <a:fillRef idx="1">
+            <a:schemeClr val="accent1"/>
+          </a:fillRef>
+          <a:effectRef idx="0">
+            <a:schemeClr val="accent1"/>
+          </a:effectRef>
+          <a:fontRef idx="minor">
+            <a:schemeClr val="lt1"/>
+          </a:fontRef>
+        </p:style>
+        <p:txBody>
+          <a:bodyPr rtlCol="0" anchor="ctr"/>
+          <a:lstStyle/>
+          <a:p>
+            <a:pPr algn="ctr"/>
+            <a:endParaRPr lang="en-US"/>
+          </a:p>
+        </p:txBody>
+      </p:sp>
+      <p:sp>
+        <p:nvSpPr>
+          <p:cNvPr id="29" name="Rectangle 28"/>
+          <p:cNvSpPr/>
+          <p:nvPr/>
+        </p:nvSpPr>
+        <p:spPr>
+          <a:xfrm>
+            <a:off x="371789" y="773724"/>
+            <a:ext cx="6099349" cy="5636601"/>
+          </a:xfrm>
+          <a:prstGeom prst="rect">
+            <a:avLst/>
+          </a:prstGeom>
+          <a:noFill/>
+        </p:spPr>
+        <p:style>
+          <a:lnRef idx="2">
+            <a:schemeClr val="accent1">
+              <a:shade val="50000"/>
+            </a:schemeClr>
+          </a:lnRef>
+          <a:fillRef idx="1">
+            <a:schemeClr val="accent1"/>
+          </a:fillRef>
+          <a:effectRef idx="0">
+            <a:schemeClr val="accent1"/>
+          </a:effectRef>
+          <a:fontRef idx="minor">
+            <a:schemeClr val="lt1"/>
+          </a:fontRef>
+        </p:style>
+        <p:txBody>
+          <a:bodyPr rtlCol="0" anchor="ctr"/>
+          <a:lstStyle/>
+          <a:p>
+            <a:pPr algn="ctr"/>
+            <a:endParaRPr lang="en-US"/>
+          </a:p>
+        </p:txBody>
+      </p:sp>
+      <p:sp>
+        <p:nvSpPr>
+          <p:cNvPr id="30" name="Rectangle 29"/>
+          <p:cNvSpPr/>
+          <p:nvPr/>
+        </p:nvSpPr>
+        <p:spPr>
+          <a:xfrm>
+            <a:off x="150820" y="646975"/>
+            <a:ext cx="143867" cy="69623"/>
+          </a:xfrm>
+          <a:prstGeom prst="rect">
+            <a:avLst/>
+          </a:prstGeom>
+        </p:spPr>
+        <p:style>
+          <a:lnRef idx="2">
+            <a:schemeClr val="accent1">
+              <a:shade val="50000"/>
+            </a:schemeClr>
+          </a:lnRef>
+          <a:fillRef idx="1">
+            <a:schemeClr val="accent1"/>
+          </a:fillRef>
+          <a:effectRef idx="0">
+            <a:schemeClr val="accent1"/>
+          </a:effectRef>
+          <a:fontRef idx="minor">
+            <a:schemeClr val="lt1"/>
+          </a:fontRef>
+        </p:style>
+        <p:txBody>
+          <a:bodyPr rtlCol="0" anchor="ctr"/>
+          <a:lstStyle/>
+          <a:p>
+            <a:pPr algn="ctr"/>
+            <a:endParaRPr lang="en-US"/>
+          </a:p>
+        </p:txBody>
+      </p:sp>
+      <p:sp>
+        <p:nvSpPr>
+          <p:cNvPr id="42" name="Rectangle 41"/>
+          <p:cNvSpPr/>
+          <p:nvPr/>
+        </p:nvSpPr>
+        <p:spPr>
+          <a:xfrm>
+            <a:off x="6559955" y="640969"/>
+            <a:ext cx="143867" cy="69623"/>
+          </a:xfrm>
+          <a:prstGeom prst="rect">
+            <a:avLst/>
+          </a:prstGeom>
+        </p:spPr>
+        <p:style>
+          <a:lnRef idx="2">
+            <a:schemeClr val="accent1">
+              <a:shade val="50000"/>
+            </a:schemeClr>
+          </a:lnRef>
+          <a:fillRef idx="1">
+            <a:schemeClr val="accent1"/>
+          </a:fillRef>
+          <a:effectRef idx="0">
+            <a:schemeClr val="accent1"/>
+          </a:effectRef>
+          <a:fontRef idx="minor">
+            <a:schemeClr val="lt1"/>
+          </a:fontRef>
+        </p:style>
+        <p:txBody>
+          <a:bodyPr rtlCol="0" anchor="ctr"/>
+          <a:lstStyle/>
+          <a:p>
+            <a:pPr algn="ctr"/>
+            <a:endParaRPr lang="en-US"/>
+          </a:p>
+        </p:txBody>
+      </p:sp>
+      <p:sp>
+        <p:nvSpPr>
+          <p:cNvPr id="43" name="Rectangle 42"/>
+          <p:cNvSpPr/>
+          <p:nvPr/>
+        </p:nvSpPr>
+        <p:spPr>
+          <a:xfrm>
+            <a:off x="150820" y="3255209"/>
+            <a:ext cx="143867" cy="69623"/>
+          </a:xfrm>
+          <a:prstGeom prst="rect">
+            <a:avLst/>
+          </a:prstGeom>
+        </p:spPr>
+        <p:style>
+          <a:lnRef idx="2">
+            <a:schemeClr val="accent1">
+              <a:shade val="50000"/>
+            </a:schemeClr>
+          </a:lnRef>
+          <a:fillRef idx="1">
+            <a:schemeClr val="accent1"/>
+          </a:fillRef>
+          <a:effectRef idx="0">
+            <a:schemeClr val="accent1"/>
+          </a:effectRef>
+          <a:fontRef idx="minor">
+            <a:schemeClr val="lt1"/>
+          </a:fontRef>
+        </p:style>
+        <p:txBody>
+          <a:bodyPr rtlCol="0" anchor="ctr"/>
+          <a:lstStyle/>
+          <a:p>
+            <a:pPr algn="ctr"/>
+            <a:endParaRPr lang="en-US"/>
+          </a:p>
+        </p:txBody>
+      </p:sp>
+      <p:sp>
+        <p:nvSpPr>
+          <p:cNvPr id="44" name="Rectangle 43"/>
+          <p:cNvSpPr/>
+          <p:nvPr/>
+        </p:nvSpPr>
+        <p:spPr>
+          <a:xfrm>
+            <a:off x="6559955" y="3249203"/>
+            <a:ext cx="143867" cy="69623"/>
+          </a:xfrm>
+          <a:prstGeom prst="rect">
+            <a:avLst/>
+          </a:prstGeom>
+        </p:spPr>
+        <p:style>
+          <a:lnRef idx="2">
+            <a:schemeClr val="accent1">
+              <a:shade val="50000"/>
+            </a:schemeClr>
+          </a:lnRef>
+          <a:fillRef idx="1">
+            <a:schemeClr val="accent1"/>
+          </a:fillRef>
+          <a:effectRef idx="0">
+            <a:schemeClr val="accent1"/>
+          </a:effectRef>
+          <a:fontRef idx="minor">
+            <a:schemeClr val="lt1"/>
+          </a:fontRef>
+        </p:style>
+        <p:txBody>
+          <a:bodyPr rtlCol="0" anchor="ctr"/>
+          <a:lstStyle/>
+          <a:p>
+            <a:pPr algn="ctr"/>
+            <a:endParaRPr lang="en-US"/>
+          </a:p>
+        </p:txBody>
+      </p:sp>
+      <p:sp>
+        <p:nvSpPr>
+          <p:cNvPr id="45" name="Rectangle 44"/>
+          <p:cNvSpPr/>
+          <p:nvPr/>
+        </p:nvSpPr>
+        <p:spPr>
+          <a:xfrm>
+            <a:off x="150820" y="3598526"/>
+            <a:ext cx="143867" cy="69623"/>
+          </a:xfrm>
+          <a:prstGeom prst="rect">
+            <a:avLst/>
+          </a:prstGeom>
+        </p:spPr>
+        <p:style>
+          <a:lnRef idx="2">
+            <a:schemeClr val="accent1">
+              <a:shade val="50000"/>
+            </a:schemeClr>
+          </a:lnRef>
+          <a:fillRef idx="1">
+            <a:schemeClr val="accent1"/>
+          </a:fillRef>
+          <a:effectRef idx="0">
+            <a:schemeClr val="accent1"/>
+          </a:effectRef>
+          <a:fontRef idx="minor">
+            <a:schemeClr val="lt1"/>
+          </a:fontRef>
+        </p:style>
+        <p:txBody>
+          <a:bodyPr rtlCol="0" anchor="ctr"/>
+          <a:lstStyle/>
+          <a:p>
+            <a:pPr algn="ctr"/>
+            <a:endParaRPr lang="en-US"/>
+          </a:p>
+        </p:txBody>
+      </p:sp>
+      <p:sp>
+        <p:nvSpPr>
+          <p:cNvPr id="46" name="Rectangle 45"/>
+          <p:cNvSpPr/>
+          <p:nvPr/>
+        </p:nvSpPr>
+        <p:spPr>
+          <a:xfrm>
+            <a:off x="6559955" y="3592520"/>
+            <a:ext cx="143867" cy="69623"/>
+          </a:xfrm>
+          <a:prstGeom prst="rect">
+            <a:avLst/>
+          </a:prstGeom>
+        </p:spPr>
+        <p:style>
+          <a:lnRef idx="2">
+            <a:schemeClr val="accent1">
+              <a:shade val="50000"/>
+            </a:schemeClr>
+          </a:lnRef>
+          <a:fillRef idx="1">
+            <a:schemeClr val="accent1"/>
+          </a:fillRef>
+          <a:effectRef idx="0">
+            <a:schemeClr val="accent1"/>
+          </a:effectRef>
+          <a:fontRef idx="minor">
+            <a:schemeClr val="lt1"/>
+          </a:fontRef>
+        </p:style>
+        <p:txBody>
+          <a:bodyPr rtlCol="0" anchor="ctr"/>
+          <a:lstStyle/>
+          <a:p>
+            <a:pPr algn="ctr"/>
+            <a:endParaRPr lang="en-US"/>
+          </a:p>
+        </p:txBody>
+      </p:sp>
+      <p:sp>
+        <p:nvSpPr>
+          <p:cNvPr id="47" name="Rectangle 46"/>
+          <p:cNvSpPr/>
+          <p:nvPr/>
+        </p:nvSpPr>
+        <p:spPr>
+          <a:xfrm>
+            <a:off x="150820" y="6191206"/>
+            <a:ext cx="143867" cy="69623"/>
+          </a:xfrm>
+          <a:prstGeom prst="rect">
+            <a:avLst/>
+          </a:prstGeom>
+        </p:spPr>
+        <p:style>
+          <a:lnRef idx="2">
+            <a:schemeClr val="accent1">
+              <a:shade val="50000"/>
+            </a:schemeClr>
+          </a:lnRef>
+          <a:fillRef idx="1">
+            <a:schemeClr val="accent1"/>
+          </a:fillRef>
+          <a:effectRef idx="0">
+            <a:schemeClr val="accent1"/>
+          </a:effectRef>
+          <a:fontRef idx="minor">
+            <a:schemeClr val="lt1"/>
+          </a:fontRef>
+        </p:style>
+        <p:txBody>
+          <a:bodyPr rtlCol="0" anchor="ctr"/>
+          <a:lstStyle/>
+          <a:p>
+            <a:pPr algn="ctr"/>
+            <a:endParaRPr lang="en-US"/>
+          </a:p>
+        </p:txBody>
+      </p:sp>
+      <p:sp>
+        <p:nvSpPr>
+          <p:cNvPr id="48" name="Rectangle 47"/>
+          <p:cNvSpPr/>
+          <p:nvPr/>
+        </p:nvSpPr>
+        <p:spPr>
+          <a:xfrm>
+            <a:off x="6559955" y="6185200"/>
+            <a:ext cx="143867" cy="69623"/>
+          </a:xfrm>
+          <a:prstGeom prst="rect">
+            <a:avLst/>
+          </a:prstGeom>
+        </p:spPr>
+        <p:style>
+          <a:lnRef idx="2">
+            <a:schemeClr val="accent1">
+              <a:shade val="50000"/>
+            </a:schemeClr>
+          </a:lnRef>
+          <a:fillRef idx="1">
+            <a:schemeClr val="accent1"/>
+          </a:fillRef>
+          <a:effectRef idx="0">
+            <a:schemeClr val="accent1"/>
+          </a:effectRef>
+          <a:fontRef idx="minor">
+            <a:schemeClr val="lt1"/>
+          </a:fontRef>
+        </p:style>
+        <p:txBody>
+          <a:bodyPr rtlCol="0" anchor="ctr"/>
+          <a:lstStyle/>
+          <a:p>
+            <a:pPr algn="ctr"/>
+            <a:endParaRPr lang="en-US"/>
+          </a:p>
+        </p:txBody>
+      </p:sp>
+      <p:sp>
+        <p:nvSpPr>
+          <p:cNvPr id="49" name="Rectangle 48"/>
+          <p:cNvSpPr/>
+          <p:nvPr/>
+        </p:nvSpPr>
+        <p:spPr>
+          <a:xfrm>
+            <a:off x="150820" y="6654091"/>
+            <a:ext cx="143867" cy="69623"/>
+          </a:xfrm>
+          <a:prstGeom prst="rect">
+            <a:avLst/>
+          </a:prstGeom>
+        </p:spPr>
+        <p:style>
+          <a:lnRef idx="2">
+            <a:schemeClr val="accent1">
+              <a:shade val="50000"/>
+            </a:schemeClr>
+          </a:lnRef>
+          <a:fillRef idx="1">
+            <a:schemeClr val="accent1"/>
+          </a:fillRef>
+          <a:effectRef idx="0">
+            <a:schemeClr val="accent1"/>
+          </a:effectRef>
+          <a:fontRef idx="minor">
+            <a:schemeClr val="lt1"/>
+          </a:fontRef>
+        </p:style>
+        <p:txBody>
+          <a:bodyPr rtlCol="0" anchor="ctr"/>
+          <a:lstStyle/>
+          <a:p>
+            <a:pPr algn="ctr"/>
+            <a:endParaRPr lang="en-US"/>
+          </a:p>
+        </p:txBody>
+      </p:sp>
+      <p:sp>
+        <p:nvSpPr>
+          <p:cNvPr id="50" name="Rectangle 49"/>
+          <p:cNvSpPr/>
+          <p:nvPr/>
+        </p:nvSpPr>
+        <p:spPr>
+          <a:xfrm>
+            <a:off x="6559955" y="6648085"/>
+            <a:ext cx="143867" cy="69623"/>
+          </a:xfrm>
+          <a:prstGeom prst="rect">
+            <a:avLst/>
+          </a:prstGeom>
+        </p:spPr>
+        <p:style>
+          <a:lnRef idx="2">
+            <a:schemeClr val="accent1">
+              <a:shade val="50000"/>
+            </a:schemeClr>
+          </a:lnRef>
+          <a:fillRef idx="1">
+            <a:schemeClr val="accent1"/>
+          </a:fillRef>
+          <a:effectRef idx="0">
+            <a:schemeClr val="accent1"/>
+          </a:effectRef>
+          <a:fontRef idx="minor">
+            <a:schemeClr val="lt1"/>
+          </a:fontRef>
+        </p:style>
+        <p:txBody>
+          <a:bodyPr rtlCol="0" anchor="ctr"/>
+          <a:lstStyle/>
+          <a:p>
+            <a:pPr algn="ctr"/>
+            <a:endParaRPr lang="en-US"/>
+          </a:p>
+        </p:txBody>
+      </p:sp>
+      <p:sp>
+        <p:nvSpPr>
+          <p:cNvPr id="51" name="Rectangle 50"/>
+          <p:cNvSpPr/>
+          <p:nvPr/>
+        </p:nvSpPr>
+        <p:spPr>
+          <a:xfrm>
+            <a:off x="150820" y="9324999"/>
+            <a:ext cx="143867" cy="69623"/>
+          </a:xfrm>
+          <a:prstGeom prst="rect">
+            <a:avLst/>
+          </a:prstGeom>
+        </p:spPr>
+        <p:style>
+          <a:lnRef idx="2">
+            <a:schemeClr val="accent1">
+              <a:shade val="50000"/>
+            </a:schemeClr>
+          </a:lnRef>
+          <a:fillRef idx="1">
+            <a:schemeClr val="accent1"/>
+          </a:fillRef>
+          <a:effectRef idx="0">
+            <a:schemeClr val="accent1"/>
+          </a:effectRef>
+          <a:fontRef idx="minor">
+            <a:schemeClr val="lt1"/>
+          </a:fontRef>
+        </p:style>
+        <p:txBody>
+          <a:bodyPr rtlCol="0" anchor="ctr"/>
+          <a:lstStyle/>
+          <a:p>
+            <a:pPr algn="ctr"/>
+            <a:endParaRPr lang="en-US"/>
+          </a:p>
+        </p:txBody>
+      </p:sp>
+      <p:sp>
+        <p:nvSpPr>
+          <p:cNvPr id="52" name="Rectangle 51"/>
+          <p:cNvSpPr/>
+          <p:nvPr/>
+        </p:nvSpPr>
+        <p:spPr>
+          <a:xfrm>
+            <a:off x="6559955" y="9318993"/>
+            <a:ext cx="143867" cy="69623"/>
+          </a:xfrm>
+          <a:prstGeom prst="rect">
+            <a:avLst/>
+          </a:prstGeom>
+        </p:spPr>
+        <p:style>
+          <a:lnRef idx="2">
+            <a:schemeClr val="accent1">
+              <a:shade val="50000"/>
+            </a:schemeClr>
+          </a:lnRef>
+          <a:fillRef idx="1">
+            <a:schemeClr val="accent1"/>
+          </a:fillRef>
+          <a:effectRef idx="0">
+            <a:schemeClr val="accent1"/>
+          </a:effectRef>
+          <a:fontRef idx="minor">
+            <a:schemeClr val="lt1"/>
+          </a:fontRef>
+        </p:style>
+        <p:txBody>
+          <a:bodyPr rtlCol="0" anchor="ctr"/>
+          <a:lstStyle/>
+          <a:p>
+            <a:pPr algn="ctr"/>
+            <a:endParaRPr lang="en-US"/>
+          </a:p>
+        </p:txBody>
+      </p:sp>
+      <p:sp>
+        <p:nvSpPr>
+          <p:cNvPr id="13" name="Rounded Rectangle 12"/>
+          <p:cNvSpPr/>
+          <p:nvPr/>
+        </p:nvSpPr>
+        <p:spPr>
+          <a:xfrm>
+            <a:off x="2760236" y="150725"/>
+            <a:ext cx="1320800" cy="369975"/>
+          </a:xfrm>
+          <a:prstGeom prst="roundRect">
+            <a:avLst/>
+          </a:prstGeom>
+          <a:noFill/>
+          <a:ln>
+            <a:prstDash val="dashDot"/>
+          </a:ln>
+        </p:spPr>
+        <p:style>
+          <a:lnRef idx="2">
+            <a:schemeClr val="accent1">
+              <a:shade val="50000"/>
+            </a:schemeClr>
+          </a:lnRef>
+          <a:fillRef idx="1">
+            <a:schemeClr val="accent1"/>
+          </a:fillRef>
+          <a:effectRef idx="0">
+            <a:schemeClr val="accent1"/>
+          </a:effectRef>
+          <a:fontRef idx="minor">
+            <a:schemeClr val="lt1"/>
+          </a:fontRef>
+        </p:style>
+        <p:txBody>
+          <a:bodyPr rtlCol="0" anchor="ctr"/>
+          <a:lstStyle/>
+          <a:p>
+            <a:pPr algn="ctr"/>
+            <a:endParaRPr lang="en-US"/>
+          </a:p>
+        </p:txBody>
+      </p:sp>
+      <p:pic>
+        <p:nvPicPr>
+          <p:cNvPr id="5" name="Picture 4"/>
+          <p:cNvPicPr>
+            <a:picLocks noChangeAspect="1"/>
+          </p:cNvPicPr>
+          <p:nvPr/>
+        </p:nvPicPr>
+        <p:blipFill rotWithShape="1">
+          <a:blip r:embed="rId2">
+            <a:extLst>
+              <a:ext uri="{28A0092B-C50C-407E-A947-70E740481C1C}">
+                <a14:useLocalDpi xmlns:a14="http://schemas.microsoft.com/office/drawing/2010/main" val="0"/>
+              </a:ext>
+            </a:extLst>
+          </a:blip>
+          <a:srcRect l="15965" t="24412" b="39844"/>
+          <a:stretch/>
+        </p:blipFill>
+        <p:spPr>
+          <a:xfrm>
+            <a:off x="535898" y="831187"/>
+            <a:ext cx="5763126" cy="2622884"/>
+          </a:xfrm>
+          <a:prstGeom prst="rect">
+            <a:avLst/>
+          </a:prstGeom>
+          <a:ln w="12700">
+            <a:solidFill>
+              <a:schemeClr val="tx1"/>
+            </a:solidFill>
+          </a:ln>
+        </p:spPr>
+      </p:pic>
+      <p:pic>
+        <p:nvPicPr>
+          <p:cNvPr id="38" name="Picture 37"/>
+          <p:cNvPicPr>
+            <a:picLocks noChangeAspect="1"/>
+          </p:cNvPicPr>
+          <p:nvPr/>
+        </p:nvPicPr>
+        <p:blipFill rotWithShape="1">
+          <a:blip r:embed="rId2">
+            <a:extLst>
+              <a:ext uri="{28A0092B-C50C-407E-A947-70E740481C1C}">
+                <a14:useLocalDpi xmlns:a14="http://schemas.microsoft.com/office/drawing/2010/main" val="0"/>
+              </a:ext>
+            </a:extLst>
+          </a:blip>
+          <a:srcRect l="15965" t="24412" b="39844"/>
+          <a:stretch/>
+        </p:blipFill>
+        <p:spPr>
+          <a:xfrm>
+            <a:off x="535898" y="3792266"/>
+            <a:ext cx="5763126" cy="2572439"/>
+          </a:xfrm>
+          <a:prstGeom prst="rect">
+            <a:avLst/>
+          </a:prstGeom>
+          <a:ln w="12700">
+            <a:solidFill>
+              <a:schemeClr val="tx1"/>
+            </a:solidFill>
+          </a:ln>
+        </p:spPr>
+      </p:pic>
+      <p:pic>
+        <p:nvPicPr>
+          <p:cNvPr id="39" name="Picture 38"/>
+          <p:cNvPicPr>
+            <a:picLocks noChangeAspect="1"/>
+          </p:cNvPicPr>
+          <p:nvPr/>
+        </p:nvPicPr>
+        <p:blipFill rotWithShape="1">
+          <a:blip r:embed="rId2">
+            <a:extLst>
+              <a:ext uri="{28A0092B-C50C-407E-A947-70E740481C1C}">
+                <a14:useLocalDpi xmlns:a14="http://schemas.microsoft.com/office/drawing/2010/main" val="0"/>
+              </a:ext>
+            </a:extLst>
+          </a:blip>
+          <a:srcRect l="15965" t="24412" b="39844"/>
+          <a:stretch/>
+        </p:blipFill>
+        <p:spPr>
+          <a:xfrm>
+            <a:off x="535898" y="6846039"/>
+            <a:ext cx="5763126" cy="2622884"/>
+          </a:xfrm>
+          <a:prstGeom prst="rect">
+            <a:avLst/>
+          </a:prstGeom>
+          <a:ln w="12700">
+            <a:solidFill>
+              <a:schemeClr val="tx1"/>
+            </a:solidFill>
+          </a:ln>
+        </p:spPr>
+      </p:pic>
+    </p:spTree>
+    <p:extLst>
+      <p:ext uri="{BB962C8B-B14F-4D97-AF65-F5344CB8AC3E}">
+        <p14:creationId xmlns:p14="http://schemas.microsoft.com/office/powerpoint/2010/main" val="2225584407"/>
       </p:ext>
     </p:extLst>
   </p:cSld>

</xml_diff>